<commit_message>
Atualização da documentação e ppt por conta do novo modelo logico
</commit_message>
<xml_diff>
--- a/Documentação/Apresentação.pptx
+++ b/Documentação/Apresentação.pptx
@@ -34198,17 +34198,19 @@
       </p:pic>
       <p:pic>
         <p:nvPicPr>
-          <p:cNvPr id="7" name="Imagem 6">
+          <p:cNvPr id="4" name="Imagem 3" descr="Tela de celular com texto preto sobre fundo branco&#10;&#10;Descrição gerada automaticamente">
             <a:extLst>
               <a:ext uri="{FF2B5EF4-FFF2-40B4-BE49-F238E27FC236}">
-                <a16:creationId xmlns:a16="http://schemas.microsoft.com/office/drawing/2014/main" id="{69992CA9-AC16-497C-9B8D-6FE2C051F052}"/>
+                <a16:creationId xmlns:a16="http://schemas.microsoft.com/office/drawing/2014/main" id="{373F7ACE-A70A-4E69-A4F3-CBFC6E0F8F8F}"/>
               </a:ext>
             </a:extLst>
           </p:cNvPr>
-          <p:cNvPicPr/>
+          <p:cNvPicPr>
+            <a:picLocks noChangeAspect="1"/>
+          </p:cNvPicPr>
           <p:nvPr/>
         </p:nvPicPr>
-        <p:blipFill rotWithShape="1">
+        <p:blipFill>
           <a:blip r:embed="rId3">
             <a:extLst>
               <a:ext uri="{28A0092B-C50C-407E-A947-70E740481C1C}">
@@ -34216,13 +34218,14 @@
               </a:ext>
             </a:extLst>
           </a:blip>
-          <a:srcRect t="5619" b="1540"/>
-          <a:stretch/>
+          <a:stretch>
+            <a:fillRect/>
+          </a:stretch>
         </p:blipFill>
         <p:spPr>
           <a:xfrm>
-            <a:off x="2824493" y="2236162"/>
-            <a:ext cx="6543014" cy="4244786"/>
+            <a:off x="3019425" y="2275694"/>
+            <a:ext cx="6153150" cy="4582306"/>
           </a:xfrm>
           <a:prstGeom prst="rect">
             <a:avLst/>

</xml_diff>

<commit_message>
Modificação no pbi e atualização do ppt
</commit_message>
<xml_diff>
--- a/Documentação/Apresentação.pptx
+++ b/Documentação/Apresentação.pptx
@@ -5,7 +5,7 @@
     <p:sldMasterId id="2147483648" r:id="rId1"/>
   </p:sldMasterIdLst>
   <p:notesMasterIdLst>
-    <p:notesMasterId r:id="rId23"/>
+    <p:notesMasterId r:id="rId25"/>
   </p:notesMasterIdLst>
   <p:sldIdLst>
     <p:sldId id="258" r:id="rId2"/>
@@ -24,11 +24,13 @@
     <p:sldId id="305" r:id="rId15"/>
     <p:sldId id="286" r:id="rId16"/>
     <p:sldId id="307" r:id="rId17"/>
-    <p:sldId id="290" r:id="rId18"/>
-    <p:sldId id="275" r:id="rId19"/>
-    <p:sldId id="306" r:id="rId20"/>
-    <p:sldId id="288" r:id="rId21"/>
-    <p:sldId id="296" r:id="rId22"/>
+    <p:sldId id="310" r:id="rId18"/>
+    <p:sldId id="311" r:id="rId19"/>
+    <p:sldId id="290" r:id="rId20"/>
+    <p:sldId id="275" r:id="rId21"/>
+    <p:sldId id="306" r:id="rId22"/>
+    <p:sldId id="288" r:id="rId23"/>
+    <p:sldId id="296" r:id="rId24"/>
   </p:sldIdLst>
   <p:sldSz cx="12192000" cy="6858000"/>
   <p:notesSz cx="6858000" cy="9144000"/>
@@ -29346,7 +29348,7 @@
           <a:p>
             <a:fld id="{9B0668C0-2704-4EB4-9C25-B8C9552B8CBB}" type="datetimeFigureOut">
               <a:rPr lang="pt-BR" smtClean="0"/>
-              <a:t>09/11/2019</a:t>
+              <a:t>13/11/2019</a:t>
             </a:fld>
             <a:endParaRPr lang="pt-BR"/>
           </a:p>
@@ -29846,7 +29848,7 @@
           <a:p>
             <a:fld id="{5CF7CA47-18C6-4698-AAB6-6FBB128E5F85}" type="slidenum">
               <a:rPr lang="pt-BR" smtClean="0"/>
-              <a:t>21</a:t>
+              <a:t>23</a:t>
             </a:fld>
             <a:endParaRPr lang="pt-BR"/>
           </a:p>
@@ -30012,7 +30014,7 @@
           <a:p>
             <a:fld id="{D8BCA7B2-8C05-43B8-BABA-DC4379CBF90D}" type="datetimeFigureOut">
               <a:rPr lang="pt-BR" smtClean="0"/>
-              <a:t>09/11/2019</a:t>
+              <a:t>13/11/2019</a:t>
             </a:fld>
             <a:endParaRPr lang="pt-BR"/>
           </a:p>
@@ -30210,7 +30212,7 @@
           <a:p>
             <a:fld id="{D8BCA7B2-8C05-43B8-BABA-DC4379CBF90D}" type="datetimeFigureOut">
               <a:rPr lang="pt-BR" smtClean="0"/>
-              <a:t>09/11/2019</a:t>
+              <a:t>13/11/2019</a:t>
             </a:fld>
             <a:endParaRPr lang="pt-BR"/>
           </a:p>
@@ -30418,7 +30420,7 @@
           <a:p>
             <a:fld id="{D8BCA7B2-8C05-43B8-BABA-DC4379CBF90D}" type="datetimeFigureOut">
               <a:rPr lang="pt-BR" smtClean="0"/>
-              <a:t>09/11/2019</a:t>
+              <a:t>13/11/2019</a:t>
             </a:fld>
             <a:endParaRPr lang="pt-BR"/>
           </a:p>
@@ -30616,7 +30618,7 @@
           <a:p>
             <a:fld id="{D8BCA7B2-8C05-43B8-BABA-DC4379CBF90D}" type="datetimeFigureOut">
               <a:rPr lang="pt-BR" smtClean="0"/>
-              <a:t>09/11/2019</a:t>
+              <a:t>13/11/2019</a:t>
             </a:fld>
             <a:endParaRPr lang="pt-BR"/>
           </a:p>
@@ -30891,7 +30893,7 @@
           <a:p>
             <a:fld id="{D8BCA7B2-8C05-43B8-BABA-DC4379CBF90D}" type="datetimeFigureOut">
               <a:rPr lang="pt-BR" smtClean="0"/>
-              <a:t>09/11/2019</a:t>
+              <a:t>13/11/2019</a:t>
             </a:fld>
             <a:endParaRPr lang="pt-BR"/>
           </a:p>
@@ -31156,7 +31158,7 @@
           <a:p>
             <a:fld id="{D8BCA7B2-8C05-43B8-BABA-DC4379CBF90D}" type="datetimeFigureOut">
               <a:rPr lang="pt-BR" smtClean="0"/>
-              <a:t>09/11/2019</a:t>
+              <a:t>13/11/2019</a:t>
             </a:fld>
             <a:endParaRPr lang="pt-BR"/>
           </a:p>
@@ -31568,7 +31570,7 @@
           <a:p>
             <a:fld id="{D8BCA7B2-8C05-43B8-BABA-DC4379CBF90D}" type="datetimeFigureOut">
               <a:rPr lang="pt-BR" smtClean="0"/>
-              <a:t>09/11/2019</a:t>
+              <a:t>13/11/2019</a:t>
             </a:fld>
             <a:endParaRPr lang="pt-BR"/>
           </a:p>
@@ -31709,7 +31711,7 @@
           <a:p>
             <a:fld id="{D8BCA7B2-8C05-43B8-BABA-DC4379CBF90D}" type="datetimeFigureOut">
               <a:rPr lang="pt-BR" smtClean="0"/>
-              <a:t>09/11/2019</a:t>
+              <a:t>13/11/2019</a:t>
             </a:fld>
             <a:endParaRPr lang="pt-BR"/>
           </a:p>
@@ -31822,7 +31824,7 @@
           <a:p>
             <a:fld id="{D8BCA7B2-8C05-43B8-BABA-DC4379CBF90D}" type="datetimeFigureOut">
               <a:rPr lang="pt-BR" smtClean="0"/>
-              <a:t>09/11/2019</a:t>
+              <a:t>13/11/2019</a:t>
             </a:fld>
             <a:endParaRPr lang="pt-BR"/>
           </a:p>
@@ -32133,7 +32135,7 @@
           <a:p>
             <a:fld id="{D8BCA7B2-8C05-43B8-BABA-DC4379CBF90D}" type="datetimeFigureOut">
               <a:rPr lang="pt-BR" smtClean="0"/>
-              <a:t>09/11/2019</a:t>
+              <a:t>13/11/2019</a:t>
             </a:fld>
             <a:endParaRPr lang="pt-BR"/>
           </a:p>
@@ -32421,7 +32423,7 @@
           <a:p>
             <a:fld id="{D8BCA7B2-8C05-43B8-BABA-DC4379CBF90D}" type="datetimeFigureOut">
               <a:rPr lang="pt-BR" smtClean="0"/>
-              <a:t>09/11/2019</a:t>
+              <a:t>13/11/2019</a:t>
             </a:fld>
             <a:endParaRPr lang="pt-BR"/>
           </a:p>
@@ -32662,7 +32664,7 @@
           <a:p>
             <a:fld id="{D8BCA7B2-8C05-43B8-BABA-DC4379CBF90D}" type="datetimeFigureOut">
               <a:rPr lang="pt-BR" smtClean="0"/>
-              <a:t>09/11/2019</a:t>
+              <a:t>13/11/2019</a:t>
             </a:fld>
             <a:endParaRPr lang="pt-BR"/>
           </a:p>
@@ -35043,6 +35045,572 @@
           <a:p>
             <a:r>
               <a:rPr lang="pt-BR" dirty="0"/>
+              <a:t>Power BI</a:t>
+            </a:r>
+          </a:p>
+        </p:txBody>
+      </p:sp>
+      <p:sp>
+        <p:nvSpPr>
+          <p:cNvPr id="42" name="Rectangle 41">
+            <a:extLst>
+              <a:ext uri="{FF2B5EF4-FFF2-40B4-BE49-F238E27FC236}">
+                <a16:creationId xmlns:a16="http://schemas.microsoft.com/office/drawing/2014/main" id="{A5711A0E-A428-4ED1-96CB-33D69FD842E4}"/>
+              </a:ext>
+              <a:ext uri="{C183D7F6-B498-43B3-948B-1728B52AA6E4}">
+                <adec:decorative xmlns:adec="http://schemas.microsoft.com/office/drawing/2017/decorative" val="1"/>
+              </a:ext>
+            </a:extLst>
+          </p:cNvPr>
+          <p:cNvSpPr>
+            <a:spLocks noGrp="1" noRot="1" noChangeAspect="1" noMove="1" noResize="1" noEditPoints="1" noAdjustHandles="1" noChangeArrowheads="1" noChangeShapeType="1" noTextEdit="1"/>
+          </p:cNvSpPr>
+          <p:nvPr>
+            <p:extLst>
+              <p:ext uri="{386F3935-93C4-4BCD-93E2-E3B085C9AB24}">
+                <p16:designElem xmlns:p16="http://schemas.microsoft.com/office/powerpoint/2015/main" val="1"/>
+              </p:ext>
+            </p:extLst>
+          </p:nvPr>
+        </p:nvSpPr>
+        <p:spPr>
+          <a:xfrm>
+            <a:off x="1000874" y="2043803"/>
+            <a:ext cx="10190252" cy="80683"/>
+          </a:xfrm>
+          <a:prstGeom prst="rect">
+            <a:avLst/>
+          </a:prstGeom>
+          <a:solidFill>
+            <a:schemeClr val="tx1">
+              <a:lumMod val="50000"/>
+              <a:lumOff val="50000"/>
+              <a:alpha val="65000"/>
+            </a:schemeClr>
+          </a:solidFill>
+          <a:ln>
+            <a:noFill/>
+          </a:ln>
+        </p:spPr>
+        <p:style>
+          <a:lnRef idx="2">
+            <a:schemeClr val="accent1">
+              <a:shade val="50000"/>
+            </a:schemeClr>
+          </a:lnRef>
+          <a:fillRef idx="1">
+            <a:schemeClr val="accent1"/>
+          </a:fillRef>
+          <a:effectRef idx="0">
+            <a:schemeClr val="accent1"/>
+          </a:effectRef>
+          <a:fontRef idx="minor">
+            <a:schemeClr val="lt1"/>
+          </a:fontRef>
+        </p:style>
+        <p:txBody>
+          <a:bodyPr rtlCol="0" anchor="ctr"/>
+          <a:lstStyle/>
+          <a:p>
+            <a:pPr marL="0" marR="0" lvl="0" indent="0" algn="ctr" defTabSz="457200" rtl="0" eaLnBrk="1" fontAlgn="auto" latinLnBrk="0" hangingPunct="1">
+              <a:lnSpc>
+                <a:spcPct val="100000"/>
+              </a:lnSpc>
+              <a:spcBef>
+                <a:spcPts val="0"/>
+              </a:spcBef>
+              <a:spcAft>
+                <a:spcPts val="0"/>
+              </a:spcAft>
+              <a:buClrTx/>
+              <a:buSzTx/>
+              <a:buFontTx/>
+              <a:buNone/>
+              <a:tabLst/>
+              <a:defRPr/>
+            </a:pPr>
+            <a:endParaRPr kumimoji="0" lang="en-US" sz="1800" b="0" i="0" u="none" strike="noStrike" kern="1200" cap="none" spc="0" normalizeH="0" baseline="0" noProof="0">
+              <a:ln>
+                <a:noFill/>
+              </a:ln>
+              <a:solidFill>
+                <a:prstClr val="white"/>
+              </a:solidFill>
+              <a:effectLst/>
+              <a:uLnTx/>
+              <a:uFillTx/>
+              <a:latin typeface="Calibri" panose="020F0502020204030204"/>
+              <a:ea typeface="+mn-ea"/>
+              <a:cs typeface="+mn-cs"/>
+            </a:endParaRPr>
+          </a:p>
+        </p:txBody>
+      </p:sp>
+      <p:pic>
+        <p:nvPicPr>
+          <p:cNvPr id="7" name="Imagem 6" descr="Uma imagem contendo luz, desenho&#10;&#10;Descrição gerada automaticamente">
+            <a:extLst>
+              <a:ext uri="{FF2B5EF4-FFF2-40B4-BE49-F238E27FC236}">
+                <a16:creationId xmlns:a16="http://schemas.microsoft.com/office/drawing/2014/main" id="{4BBAED0D-DA47-485B-B961-5992667A428B}"/>
+              </a:ext>
+            </a:extLst>
+          </p:cNvPr>
+          <p:cNvPicPr>
+            <a:picLocks noChangeAspect="1"/>
+          </p:cNvPicPr>
+          <p:nvPr/>
+        </p:nvPicPr>
+        <p:blipFill>
+          <a:blip r:embed="rId2">
+            <a:extLst>
+              <a:ext uri="{28A0092B-C50C-407E-A947-70E740481C1C}">
+                <a14:useLocalDpi xmlns:a14="http://schemas.microsoft.com/office/drawing/2010/main" val="0"/>
+              </a:ext>
+            </a:extLst>
+          </a:blip>
+          <a:stretch>
+            <a:fillRect/>
+          </a:stretch>
+        </p:blipFill>
+        <p:spPr>
+          <a:xfrm>
+            <a:off x="10229458" y="788862"/>
+            <a:ext cx="926222" cy="1028396"/>
+          </a:xfrm>
+          <a:prstGeom prst="rect">
+            <a:avLst/>
+          </a:prstGeom>
+        </p:spPr>
+      </p:pic>
+      <p:sp>
+        <p:nvSpPr>
+          <p:cNvPr id="8" name="Espaço Reservado para Conteúdo 2">
+            <a:extLst>
+              <a:ext uri="{FF2B5EF4-FFF2-40B4-BE49-F238E27FC236}">
+                <a16:creationId xmlns:a16="http://schemas.microsoft.com/office/drawing/2014/main" id="{9ADC2E69-CA9A-45D3-BC10-5A389B7FA333}"/>
+              </a:ext>
+            </a:extLst>
+          </p:cNvPr>
+          <p:cNvSpPr>
+            <a:spLocks noGrp="1"/>
+          </p:cNvSpPr>
+          <p:nvPr>
+            <p:ph idx="1"/>
+          </p:nvPr>
+        </p:nvSpPr>
+        <p:spPr>
+          <a:xfrm>
+            <a:off x="1000874" y="2358710"/>
+            <a:ext cx="10515600" cy="4351338"/>
+          </a:xfrm>
+        </p:spPr>
+        <p:txBody>
+          <a:bodyPr/>
+          <a:lstStyle/>
+          <a:p>
+            <a:r>
+              <a:rPr lang="pt-BR" sz="2400" dirty="0">
+                <a:latin typeface="+mj-lt"/>
+              </a:rPr>
+              <a:t>Analisar, visualizar e compartilhar dados</a:t>
+            </a:r>
+          </a:p>
+          <a:p>
+            <a:r>
+              <a:rPr lang="pt-BR" sz="2400" dirty="0">
+                <a:latin typeface="+mj-lt"/>
+              </a:rPr>
+              <a:t>Se conecta com praticamente todas as fontes de dados existentes</a:t>
+            </a:r>
+          </a:p>
+          <a:p>
+            <a:r>
+              <a:rPr lang="pt-BR" sz="2400" dirty="0">
+                <a:latin typeface="+mj-lt"/>
+              </a:rPr>
+              <a:t>Receber relatórios via e-mail automaticamente</a:t>
+            </a:r>
+          </a:p>
+          <a:p>
+            <a:r>
+              <a:rPr lang="pt-BR" sz="2400" dirty="0" err="1">
+                <a:latin typeface="+mj-lt"/>
+              </a:rPr>
+              <a:t>Stream</a:t>
+            </a:r>
+            <a:r>
+              <a:rPr lang="pt-BR" sz="2400" dirty="0">
+                <a:latin typeface="+mj-lt"/>
+              </a:rPr>
+              <a:t> </a:t>
+            </a:r>
+            <a:r>
+              <a:rPr lang="pt-BR" sz="2400" dirty="0" err="1">
+                <a:latin typeface="+mj-lt"/>
+              </a:rPr>
+              <a:t>analytics</a:t>
+            </a:r>
+            <a:r>
+              <a:rPr lang="pt-BR" sz="2400" dirty="0">
+                <a:latin typeface="+mj-lt"/>
+              </a:rPr>
+              <a:t> em tempo real</a:t>
+            </a:r>
+          </a:p>
+          <a:p>
+            <a:r>
+              <a:rPr lang="pt-BR" sz="2400" dirty="0">
+                <a:latin typeface="+mj-lt"/>
+              </a:rPr>
+              <a:t>Visão de 360 graus</a:t>
+            </a:r>
+          </a:p>
+          <a:p>
+            <a:r>
+              <a:rPr lang="pt-BR" sz="2400" dirty="0">
+                <a:latin typeface="+mj-lt"/>
+              </a:rPr>
+              <a:t>Tomada de decisões</a:t>
+            </a:r>
+          </a:p>
+          <a:p>
+            <a:endParaRPr lang="pt-BR" dirty="0"/>
+          </a:p>
+        </p:txBody>
+      </p:sp>
+    </p:spTree>
+    <p:extLst>
+      <p:ext uri="{BB962C8B-B14F-4D97-AF65-F5344CB8AC3E}">
+        <p14:creationId xmlns:p14="http://schemas.microsoft.com/office/powerpoint/2010/main" val="1298932341"/>
+      </p:ext>
+    </p:extLst>
+  </p:cSld>
+  <p:clrMapOvr>
+    <a:masterClrMapping/>
+  </p:clrMapOvr>
+</p:sld>
+</file>
+
+<file path=ppt/slides/slide18.xml><?xml version="1.0" encoding="utf-8"?>
+<p:sld xmlns:a="http://schemas.openxmlformats.org/drawingml/2006/main" xmlns:r="http://schemas.openxmlformats.org/officeDocument/2006/relationships" xmlns:p="http://schemas.openxmlformats.org/presentationml/2006/main">
+  <p:cSld>
+    <p:bg>
+      <p:bgPr>
+        <a:solidFill>
+          <a:schemeClr val="bg1"/>
+        </a:solidFill>
+        <a:effectLst/>
+      </p:bgPr>
+    </p:bg>
+    <p:spTree>
+      <p:nvGrpSpPr>
+        <p:cNvPr id="1" name=""/>
+        <p:cNvGrpSpPr/>
+        <p:nvPr/>
+      </p:nvGrpSpPr>
+      <p:grpSpPr>
+        <a:xfrm>
+          <a:off x="0" y="0"/>
+          <a:ext cx="0" cy="0"/>
+          <a:chOff x="0" y="0"/>
+          <a:chExt cx="0" cy="0"/>
+        </a:xfrm>
+      </p:grpSpPr>
+      <p:sp>
+        <p:nvSpPr>
+          <p:cNvPr id="2" name="Título 1">
+            <a:extLst>
+              <a:ext uri="{FF2B5EF4-FFF2-40B4-BE49-F238E27FC236}">
+                <a16:creationId xmlns:a16="http://schemas.microsoft.com/office/drawing/2014/main" id="{E0B7F696-990F-4A06-8F6A-14DCE2F6ECEA}"/>
+              </a:ext>
+            </a:extLst>
+          </p:cNvPr>
+          <p:cNvSpPr>
+            <a:spLocks noGrp="1"/>
+          </p:cNvSpPr>
+          <p:nvPr>
+            <p:ph type="title"/>
+          </p:nvPr>
+        </p:nvSpPr>
+        <p:spPr>
+          <a:xfrm>
+            <a:off x="870204" y="606564"/>
+            <a:ext cx="10451592" cy="1325563"/>
+          </a:xfrm>
+        </p:spPr>
+        <p:txBody>
+          <a:bodyPr anchor="ctr">
+            <a:normAutofit/>
+          </a:bodyPr>
+          <a:lstStyle/>
+          <a:p>
+            <a:r>
+              <a:rPr lang="pt-BR" dirty="0"/>
+              <a:t>Power BI</a:t>
+            </a:r>
+          </a:p>
+        </p:txBody>
+      </p:sp>
+      <p:sp>
+        <p:nvSpPr>
+          <p:cNvPr id="42" name="Rectangle 41">
+            <a:extLst>
+              <a:ext uri="{FF2B5EF4-FFF2-40B4-BE49-F238E27FC236}">
+                <a16:creationId xmlns:a16="http://schemas.microsoft.com/office/drawing/2014/main" id="{A5711A0E-A428-4ED1-96CB-33D69FD842E4}"/>
+              </a:ext>
+              <a:ext uri="{C183D7F6-B498-43B3-948B-1728B52AA6E4}">
+                <adec:decorative xmlns:adec="http://schemas.microsoft.com/office/drawing/2017/decorative" val="1"/>
+              </a:ext>
+            </a:extLst>
+          </p:cNvPr>
+          <p:cNvSpPr>
+            <a:spLocks noGrp="1" noRot="1" noChangeAspect="1" noMove="1" noResize="1" noEditPoints="1" noAdjustHandles="1" noChangeArrowheads="1" noChangeShapeType="1" noTextEdit="1"/>
+          </p:cNvSpPr>
+          <p:nvPr>
+            <p:extLst>
+              <p:ext uri="{386F3935-93C4-4BCD-93E2-E3B085C9AB24}">
+                <p16:designElem xmlns:p16="http://schemas.microsoft.com/office/powerpoint/2015/main" val="1"/>
+              </p:ext>
+            </p:extLst>
+          </p:nvPr>
+        </p:nvSpPr>
+        <p:spPr>
+          <a:xfrm>
+            <a:off x="1000874" y="2043803"/>
+            <a:ext cx="10190252" cy="80683"/>
+          </a:xfrm>
+          <a:prstGeom prst="rect">
+            <a:avLst/>
+          </a:prstGeom>
+          <a:solidFill>
+            <a:schemeClr val="tx1">
+              <a:lumMod val="50000"/>
+              <a:lumOff val="50000"/>
+              <a:alpha val="65000"/>
+            </a:schemeClr>
+          </a:solidFill>
+          <a:ln>
+            <a:noFill/>
+          </a:ln>
+        </p:spPr>
+        <p:style>
+          <a:lnRef idx="2">
+            <a:schemeClr val="accent1">
+              <a:shade val="50000"/>
+            </a:schemeClr>
+          </a:lnRef>
+          <a:fillRef idx="1">
+            <a:schemeClr val="accent1"/>
+          </a:fillRef>
+          <a:effectRef idx="0">
+            <a:schemeClr val="accent1"/>
+          </a:effectRef>
+          <a:fontRef idx="minor">
+            <a:schemeClr val="lt1"/>
+          </a:fontRef>
+        </p:style>
+        <p:txBody>
+          <a:bodyPr rtlCol="0" anchor="ctr"/>
+          <a:lstStyle/>
+          <a:p>
+            <a:pPr marL="0" marR="0" lvl="0" indent="0" algn="ctr" defTabSz="457200" rtl="0" eaLnBrk="1" fontAlgn="auto" latinLnBrk="0" hangingPunct="1">
+              <a:lnSpc>
+                <a:spcPct val="100000"/>
+              </a:lnSpc>
+              <a:spcBef>
+                <a:spcPts val="0"/>
+              </a:spcBef>
+              <a:spcAft>
+                <a:spcPts val="0"/>
+              </a:spcAft>
+              <a:buClrTx/>
+              <a:buSzTx/>
+              <a:buFontTx/>
+              <a:buNone/>
+              <a:tabLst/>
+              <a:defRPr/>
+            </a:pPr>
+            <a:endParaRPr kumimoji="0" lang="en-US" sz="1800" b="0" i="0" u="none" strike="noStrike" kern="1200" cap="none" spc="0" normalizeH="0" baseline="0" noProof="0">
+              <a:ln>
+                <a:noFill/>
+              </a:ln>
+              <a:solidFill>
+                <a:prstClr val="white"/>
+              </a:solidFill>
+              <a:effectLst/>
+              <a:uLnTx/>
+              <a:uFillTx/>
+              <a:latin typeface="Calibri" panose="020F0502020204030204"/>
+              <a:ea typeface="+mn-ea"/>
+              <a:cs typeface="+mn-cs"/>
+            </a:endParaRPr>
+          </a:p>
+        </p:txBody>
+      </p:sp>
+      <p:pic>
+        <p:nvPicPr>
+          <p:cNvPr id="7" name="Imagem 6" descr="Uma imagem contendo luz, desenho&#10;&#10;Descrição gerada automaticamente">
+            <a:extLst>
+              <a:ext uri="{FF2B5EF4-FFF2-40B4-BE49-F238E27FC236}">
+                <a16:creationId xmlns:a16="http://schemas.microsoft.com/office/drawing/2014/main" id="{4BBAED0D-DA47-485B-B961-5992667A428B}"/>
+              </a:ext>
+            </a:extLst>
+          </p:cNvPr>
+          <p:cNvPicPr>
+            <a:picLocks noChangeAspect="1"/>
+          </p:cNvPicPr>
+          <p:nvPr/>
+        </p:nvPicPr>
+        <p:blipFill>
+          <a:blip r:embed="rId2">
+            <a:extLst>
+              <a:ext uri="{28A0092B-C50C-407E-A947-70E740481C1C}">
+                <a14:useLocalDpi xmlns:a14="http://schemas.microsoft.com/office/drawing/2010/main" val="0"/>
+              </a:ext>
+            </a:extLst>
+          </a:blip>
+          <a:stretch>
+            <a:fillRect/>
+          </a:stretch>
+        </p:blipFill>
+        <p:spPr>
+          <a:xfrm>
+            <a:off x="10229458" y="788862"/>
+            <a:ext cx="926222" cy="1028396"/>
+          </a:xfrm>
+          <a:prstGeom prst="rect">
+            <a:avLst/>
+          </a:prstGeom>
+        </p:spPr>
+      </p:pic>
+      <p:pic>
+        <p:nvPicPr>
+          <p:cNvPr id="9" name="Imagem 8">
+            <a:extLst>
+              <a:ext uri="{FF2B5EF4-FFF2-40B4-BE49-F238E27FC236}">
+                <a16:creationId xmlns:a16="http://schemas.microsoft.com/office/drawing/2014/main" id="{E8508EF2-E0E2-435E-AF36-C9E89AF5CFBB}"/>
+              </a:ext>
+            </a:extLst>
+          </p:cNvPr>
+          <p:cNvPicPr>
+            <a:picLocks noChangeAspect="1"/>
+          </p:cNvPicPr>
+          <p:nvPr/>
+        </p:nvPicPr>
+        <p:blipFill>
+          <a:blip r:embed="rId3"/>
+          <a:stretch>
+            <a:fillRect/>
+          </a:stretch>
+        </p:blipFill>
+        <p:spPr>
+          <a:xfrm>
+            <a:off x="1492773" y="2482998"/>
+            <a:ext cx="9370979" cy="1817435"/>
+          </a:xfrm>
+          <a:prstGeom prst="rect">
+            <a:avLst/>
+          </a:prstGeom>
+        </p:spPr>
+      </p:pic>
+      <p:pic>
+        <p:nvPicPr>
+          <p:cNvPr id="10" name="Imagem 9">
+            <a:extLst>
+              <a:ext uri="{FF2B5EF4-FFF2-40B4-BE49-F238E27FC236}">
+                <a16:creationId xmlns:a16="http://schemas.microsoft.com/office/drawing/2014/main" id="{3A53CD80-A4B2-40DD-8332-F808AA712A94}"/>
+              </a:ext>
+            </a:extLst>
+          </p:cNvPr>
+          <p:cNvPicPr>
+            <a:picLocks noChangeAspect="1"/>
+          </p:cNvPicPr>
+          <p:nvPr/>
+        </p:nvPicPr>
+        <p:blipFill>
+          <a:blip r:embed="rId4"/>
+          <a:stretch>
+            <a:fillRect/>
+          </a:stretch>
+        </p:blipFill>
+        <p:spPr>
+          <a:xfrm>
+            <a:off x="870204" y="4651435"/>
+            <a:ext cx="10616119" cy="2076261"/>
+          </a:xfrm>
+          <a:prstGeom prst="rect">
+            <a:avLst/>
+          </a:prstGeom>
+        </p:spPr>
+      </p:pic>
+    </p:spTree>
+    <p:extLst>
+      <p:ext uri="{BB962C8B-B14F-4D97-AF65-F5344CB8AC3E}">
+        <p14:creationId xmlns:p14="http://schemas.microsoft.com/office/powerpoint/2010/main" val="4143444967"/>
+      </p:ext>
+    </p:extLst>
+  </p:cSld>
+  <p:clrMapOvr>
+    <a:masterClrMapping/>
+  </p:clrMapOvr>
+</p:sld>
+</file>
+
+<file path=ppt/slides/slide19.xml><?xml version="1.0" encoding="utf-8"?>
+<p:sld xmlns:a="http://schemas.openxmlformats.org/drawingml/2006/main" xmlns:r="http://schemas.openxmlformats.org/officeDocument/2006/relationships" xmlns:p="http://schemas.openxmlformats.org/presentationml/2006/main">
+  <p:cSld>
+    <p:bg>
+      <p:bgPr>
+        <a:solidFill>
+          <a:schemeClr val="bg1"/>
+        </a:solidFill>
+        <a:effectLst/>
+      </p:bgPr>
+    </p:bg>
+    <p:spTree>
+      <p:nvGrpSpPr>
+        <p:cNvPr id="1" name=""/>
+        <p:cNvGrpSpPr/>
+        <p:nvPr/>
+      </p:nvGrpSpPr>
+      <p:grpSpPr>
+        <a:xfrm>
+          <a:off x="0" y="0"/>
+          <a:ext cx="0" cy="0"/>
+          <a:chOff x="0" y="0"/>
+          <a:chExt cx="0" cy="0"/>
+        </a:xfrm>
+      </p:grpSpPr>
+      <p:sp>
+        <p:nvSpPr>
+          <p:cNvPr id="2" name="Título 1">
+            <a:extLst>
+              <a:ext uri="{FF2B5EF4-FFF2-40B4-BE49-F238E27FC236}">
+                <a16:creationId xmlns:a16="http://schemas.microsoft.com/office/drawing/2014/main" id="{E0B7F696-990F-4A06-8F6A-14DCE2F6ECEA}"/>
+              </a:ext>
+            </a:extLst>
+          </p:cNvPr>
+          <p:cNvSpPr>
+            <a:spLocks noGrp="1"/>
+          </p:cNvSpPr>
+          <p:nvPr>
+            <p:ph type="title"/>
+          </p:nvPr>
+        </p:nvSpPr>
+        <p:spPr>
+          <a:xfrm>
+            <a:off x="870204" y="606564"/>
+            <a:ext cx="10451592" cy="1325563"/>
+          </a:xfrm>
+        </p:spPr>
+        <p:txBody>
+          <a:bodyPr anchor="ctr">
+            <a:normAutofit/>
+          </a:bodyPr>
+          <a:lstStyle/>
+          <a:p>
+            <a:r>
+              <a:rPr lang="pt-BR" dirty="0"/>
               <a:t>ALERTAS</a:t>
             </a:r>
           </a:p>
@@ -35184,475 +35752,6 @@
     <p:extLst>
       <p:ext uri="{BB962C8B-B14F-4D97-AF65-F5344CB8AC3E}">
         <p14:creationId xmlns:p14="http://schemas.microsoft.com/office/powerpoint/2010/main" val="1361539501"/>
-      </p:ext>
-    </p:extLst>
-  </p:cSld>
-  <p:clrMapOvr>
-    <a:masterClrMapping/>
-  </p:clrMapOvr>
-</p:sld>
-</file>
-
-<file path=ppt/slides/slide18.xml><?xml version="1.0" encoding="utf-8"?>
-<p:sld xmlns:a="http://schemas.openxmlformats.org/drawingml/2006/main" xmlns:r="http://schemas.openxmlformats.org/officeDocument/2006/relationships" xmlns:p="http://schemas.openxmlformats.org/presentationml/2006/main">
-  <p:cSld>
-    <p:bg>
-      <p:bgPr>
-        <a:solidFill>
-          <a:schemeClr val="bg1"/>
-        </a:solidFill>
-        <a:effectLst/>
-      </p:bgPr>
-    </p:bg>
-    <p:spTree>
-      <p:nvGrpSpPr>
-        <p:cNvPr id="1" name=""/>
-        <p:cNvGrpSpPr/>
-        <p:nvPr/>
-      </p:nvGrpSpPr>
-      <p:grpSpPr>
-        <a:xfrm>
-          <a:off x="0" y="0"/>
-          <a:ext cx="0" cy="0"/>
-          <a:chOff x="0" y="0"/>
-          <a:chExt cx="0" cy="0"/>
-        </a:xfrm>
-      </p:grpSpPr>
-      <p:sp>
-        <p:nvSpPr>
-          <p:cNvPr id="2" name="Título 1">
-            <a:extLst>
-              <a:ext uri="{FF2B5EF4-FFF2-40B4-BE49-F238E27FC236}">
-                <a16:creationId xmlns:a16="http://schemas.microsoft.com/office/drawing/2014/main" id="{E0B7F696-990F-4A06-8F6A-14DCE2F6ECEA}"/>
-              </a:ext>
-            </a:extLst>
-          </p:cNvPr>
-          <p:cNvSpPr>
-            <a:spLocks noGrp="1"/>
-          </p:cNvSpPr>
-          <p:nvPr>
-            <p:ph type="title"/>
-          </p:nvPr>
-        </p:nvSpPr>
-        <p:spPr>
-          <a:xfrm>
-            <a:off x="870204" y="606564"/>
-            <a:ext cx="10451592" cy="1325563"/>
-          </a:xfrm>
-        </p:spPr>
-        <p:txBody>
-          <a:bodyPr anchor="ctr">
-            <a:normAutofit/>
-          </a:bodyPr>
-          <a:lstStyle/>
-          <a:p>
-            <a:r>
-              <a:rPr lang="pt-BR" dirty="0"/>
-              <a:t>HELP DESK</a:t>
-            </a:r>
-          </a:p>
-        </p:txBody>
-      </p:sp>
-      <p:sp>
-        <p:nvSpPr>
-          <p:cNvPr id="42" name="Rectangle 41">
-            <a:extLst>
-              <a:ext uri="{FF2B5EF4-FFF2-40B4-BE49-F238E27FC236}">
-                <a16:creationId xmlns:a16="http://schemas.microsoft.com/office/drawing/2014/main" id="{A5711A0E-A428-4ED1-96CB-33D69FD842E4}"/>
-              </a:ext>
-              <a:ext uri="{C183D7F6-B498-43B3-948B-1728B52AA6E4}">
-                <adec:decorative xmlns:adec="http://schemas.microsoft.com/office/drawing/2017/decorative" val="1"/>
-              </a:ext>
-            </a:extLst>
-          </p:cNvPr>
-          <p:cNvSpPr>
-            <a:spLocks noGrp="1" noRot="1" noChangeAspect="1" noMove="1" noResize="1" noEditPoints="1" noAdjustHandles="1" noChangeArrowheads="1" noChangeShapeType="1" noTextEdit="1"/>
-          </p:cNvSpPr>
-          <p:nvPr>
-            <p:extLst>
-              <p:ext uri="{386F3935-93C4-4BCD-93E2-E3B085C9AB24}">
-                <p16:designElem xmlns:p16="http://schemas.microsoft.com/office/powerpoint/2015/main" val="1"/>
-              </p:ext>
-            </p:extLst>
-          </p:nvPr>
-        </p:nvSpPr>
-        <p:spPr>
-          <a:xfrm>
-            <a:off x="1000874" y="2043803"/>
-            <a:ext cx="10190252" cy="80683"/>
-          </a:xfrm>
-          <a:prstGeom prst="rect">
-            <a:avLst/>
-          </a:prstGeom>
-          <a:solidFill>
-            <a:schemeClr val="tx1">
-              <a:lumMod val="50000"/>
-              <a:lumOff val="50000"/>
-              <a:alpha val="65000"/>
-            </a:schemeClr>
-          </a:solidFill>
-          <a:ln>
-            <a:noFill/>
-          </a:ln>
-        </p:spPr>
-        <p:style>
-          <a:lnRef idx="2">
-            <a:schemeClr val="accent1">
-              <a:shade val="50000"/>
-            </a:schemeClr>
-          </a:lnRef>
-          <a:fillRef idx="1">
-            <a:schemeClr val="accent1"/>
-          </a:fillRef>
-          <a:effectRef idx="0">
-            <a:schemeClr val="accent1"/>
-          </a:effectRef>
-          <a:fontRef idx="minor">
-            <a:schemeClr val="lt1"/>
-          </a:fontRef>
-        </p:style>
-        <p:txBody>
-          <a:bodyPr rtlCol="0" anchor="ctr"/>
-          <a:lstStyle/>
-          <a:p>
-            <a:pPr marL="0" marR="0" lvl="0" indent="0" algn="ctr" defTabSz="457200" rtl="0" eaLnBrk="1" fontAlgn="auto" latinLnBrk="0" hangingPunct="1">
-              <a:lnSpc>
-                <a:spcPct val="100000"/>
-              </a:lnSpc>
-              <a:spcBef>
-                <a:spcPts val="0"/>
-              </a:spcBef>
-              <a:spcAft>
-                <a:spcPts val="0"/>
-              </a:spcAft>
-              <a:buClrTx/>
-              <a:buSzTx/>
-              <a:buFontTx/>
-              <a:buNone/>
-              <a:tabLst/>
-              <a:defRPr/>
-            </a:pPr>
-            <a:endParaRPr kumimoji="0" lang="en-US" sz="1800" b="0" i="0" u="none" strike="noStrike" kern="1200" cap="none" spc="0" normalizeH="0" baseline="0" noProof="0">
-              <a:ln>
-                <a:noFill/>
-              </a:ln>
-              <a:solidFill>
-                <a:prstClr val="white"/>
-              </a:solidFill>
-              <a:effectLst/>
-              <a:uLnTx/>
-              <a:uFillTx/>
-              <a:latin typeface="Calibri" panose="020F0502020204030204"/>
-              <a:ea typeface="+mn-ea"/>
-              <a:cs typeface="+mn-cs"/>
-            </a:endParaRPr>
-          </a:p>
-        </p:txBody>
-      </p:sp>
-      <p:pic>
-        <p:nvPicPr>
-          <p:cNvPr id="7" name="Imagem 6" descr="Uma imagem contendo luz, desenho&#10;&#10;Descrição gerada automaticamente">
-            <a:extLst>
-              <a:ext uri="{FF2B5EF4-FFF2-40B4-BE49-F238E27FC236}">
-                <a16:creationId xmlns:a16="http://schemas.microsoft.com/office/drawing/2014/main" id="{3FD6C9A3-B2D1-4C73-AFA5-325F16E6C0E7}"/>
-              </a:ext>
-            </a:extLst>
-          </p:cNvPr>
-          <p:cNvPicPr>
-            <a:picLocks noChangeAspect="1"/>
-          </p:cNvPicPr>
-          <p:nvPr/>
-        </p:nvPicPr>
-        <p:blipFill>
-          <a:blip r:embed="rId2">
-            <a:extLst>
-              <a:ext uri="{28A0092B-C50C-407E-A947-70E740481C1C}">
-                <a14:useLocalDpi xmlns:a14="http://schemas.microsoft.com/office/drawing/2010/main" val="0"/>
-              </a:ext>
-            </a:extLst>
-          </a:blip>
-          <a:stretch>
-            <a:fillRect/>
-          </a:stretch>
-        </p:blipFill>
-        <p:spPr>
-          <a:xfrm>
-            <a:off x="10229458" y="788862"/>
-            <a:ext cx="926222" cy="1028396"/>
-          </a:xfrm>
-          <a:prstGeom prst="rect">
-            <a:avLst/>
-          </a:prstGeom>
-        </p:spPr>
-      </p:pic>
-      <p:pic>
-        <p:nvPicPr>
-          <p:cNvPr id="4" name="Espaço Reservado para Conteúdo 3" descr="Tela de celular com texto preto sobre fundo branco&#10;&#10;Descrição gerada automaticamente">
-            <a:extLst>
-              <a:ext uri="{FF2B5EF4-FFF2-40B4-BE49-F238E27FC236}">
-                <a16:creationId xmlns:a16="http://schemas.microsoft.com/office/drawing/2014/main" id="{FBF84780-404E-45BF-A797-C39BEFD5F987}"/>
-              </a:ext>
-            </a:extLst>
-          </p:cNvPr>
-          <p:cNvPicPr>
-            <a:picLocks noGrp="1" noChangeAspect="1"/>
-          </p:cNvPicPr>
-          <p:nvPr>
-            <p:ph idx="1"/>
-          </p:nvPr>
-        </p:nvPicPr>
-        <p:blipFill rotWithShape="1">
-          <a:blip r:embed="rId3">
-            <a:extLst>
-              <a:ext uri="{28A0092B-C50C-407E-A947-70E740481C1C}">
-                <a14:useLocalDpi xmlns:a14="http://schemas.microsoft.com/office/drawing/2010/main" val="0"/>
-              </a:ext>
-            </a:extLst>
-          </a:blip>
-          <a:srcRect/>
-          <a:stretch/>
-        </p:blipFill>
-        <p:spPr>
-          <a:xfrm>
-            <a:off x="2766680" y="2124486"/>
-            <a:ext cx="6658640" cy="4757982"/>
-          </a:xfrm>
-        </p:spPr>
-      </p:pic>
-    </p:spTree>
-    <p:extLst>
-      <p:ext uri="{BB962C8B-B14F-4D97-AF65-F5344CB8AC3E}">
-        <p14:creationId xmlns:p14="http://schemas.microsoft.com/office/powerpoint/2010/main" val="3515412249"/>
-      </p:ext>
-    </p:extLst>
-  </p:cSld>
-  <p:clrMapOvr>
-    <a:masterClrMapping/>
-  </p:clrMapOvr>
-</p:sld>
-</file>
-
-<file path=ppt/slides/slide19.xml><?xml version="1.0" encoding="utf-8"?>
-<p:sld xmlns:a="http://schemas.openxmlformats.org/drawingml/2006/main" xmlns:r="http://schemas.openxmlformats.org/officeDocument/2006/relationships" xmlns:p="http://schemas.openxmlformats.org/presentationml/2006/main">
-  <p:cSld>
-    <p:bg>
-      <p:bgPr>
-        <a:solidFill>
-          <a:schemeClr val="bg1"/>
-        </a:solidFill>
-        <a:effectLst/>
-      </p:bgPr>
-    </p:bg>
-    <p:spTree>
-      <p:nvGrpSpPr>
-        <p:cNvPr id="1" name=""/>
-        <p:cNvGrpSpPr/>
-        <p:nvPr/>
-      </p:nvGrpSpPr>
-      <p:grpSpPr>
-        <a:xfrm>
-          <a:off x="0" y="0"/>
-          <a:ext cx="0" cy="0"/>
-          <a:chOff x="0" y="0"/>
-          <a:chExt cx="0" cy="0"/>
-        </a:xfrm>
-      </p:grpSpPr>
-      <p:sp>
-        <p:nvSpPr>
-          <p:cNvPr id="2" name="Título 1">
-            <a:extLst>
-              <a:ext uri="{FF2B5EF4-FFF2-40B4-BE49-F238E27FC236}">
-                <a16:creationId xmlns:a16="http://schemas.microsoft.com/office/drawing/2014/main" id="{E0B7F696-990F-4A06-8F6A-14DCE2F6ECEA}"/>
-              </a:ext>
-            </a:extLst>
-          </p:cNvPr>
-          <p:cNvSpPr>
-            <a:spLocks noGrp="1"/>
-          </p:cNvSpPr>
-          <p:nvPr>
-            <p:ph type="title"/>
-          </p:nvPr>
-        </p:nvSpPr>
-        <p:spPr>
-          <a:xfrm>
-            <a:off x="870204" y="606564"/>
-            <a:ext cx="10451592" cy="1325563"/>
-          </a:xfrm>
-        </p:spPr>
-        <p:txBody>
-          <a:bodyPr anchor="ctr">
-            <a:normAutofit/>
-          </a:bodyPr>
-          <a:lstStyle/>
-          <a:p>
-            <a:r>
-              <a:rPr lang="pt-BR" dirty="0"/>
-              <a:t>HELP DESK</a:t>
-            </a:r>
-          </a:p>
-        </p:txBody>
-      </p:sp>
-      <p:sp>
-        <p:nvSpPr>
-          <p:cNvPr id="42" name="Rectangle 41">
-            <a:extLst>
-              <a:ext uri="{FF2B5EF4-FFF2-40B4-BE49-F238E27FC236}">
-                <a16:creationId xmlns:a16="http://schemas.microsoft.com/office/drawing/2014/main" id="{A5711A0E-A428-4ED1-96CB-33D69FD842E4}"/>
-              </a:ext>
-              <a:ext uri="{C183D7F6-B498-43B3-948B-1728B52AA6E4}">
-                <adec:decorative xmlns:adec="http://schemas.microsoft.com/office/drawing/2017/decorative" val="1"/>
-              </a:ext>
-            </a:extLst>
-          </p:cNvPr>
-          <p:cNvSpPr>
-            <a:spLocks noGrp="1" noRot="1" noChangeAspect="1" noMove="1" noResize="1" noEditPoints="1" noAdjustHandles="1" noChangeArrowheads="1" noChangeShapeType="1" noTextEdit="1"/>
-          </p:cNvSpPr>
-          <p:nvPr>
-            <p:extLst>
-              <p:ext uri="{386F3935-93C4-4BCD-93E2-E3B085C9AB24}">
-                <p16:designElem xmlns:p16="http://schemas.microsoft.com/office/powerpoint/2015/main" val="1"/>
-              </p:ext>
-            </p:extLst>
-          </p:nvPr>
-        </p:nvSpPr>
-        <p:spPr>
-          <a:xfrm>
-            <a:off x="1000874" y="2043803"/>
-            <a:ext cx="10190252" cy="80683"/>
-          </a:xfrm>
-          <a:prstGeom prst="rect">
-            <a:avLst/>
-          </a:prstGeom>
-          <a:solidFill>
-            <a:schemeClr val="tx1">
-              <a:lumMod val="50000"/>
-              <a:lumOff val="50000"/>
-              <a:alpha val="65000"/>
-            </a:schemeClr>
-          </a:solidFill>
-          <a:ln>
-            <a:noFill/>
-          </a:ln>
-        </p:spPr>
-        <p:style>
-          <a:lnRef idx="2">
-            <a:schemeClr val="accent1">
-              <a:shade val="50000"/>
-            </a:schemeClr>
-          </a:lnRef>
-          <a:fillRef idx="1">
-            <a:schemeClr val="accent1"/>
-          </a:fillRef>
-          <a:effectRef idx="0">
-            <a:schemeClr val="accent1"/>
-          </a:effectRef>
-          <a:fontRef idx="minor">
-            <a:schemeClr val="lt1"/>
-          </a:fontRef>
-        </p:style>
-        <p:txBody>
-          <a:bodyPr rtlCol="0" anchor="ctr"/>
-          <a:lstStyle/>
-          <a:p>
-            <a:pPr marL="0" marR="0" lvl="0" indent="0" algn="ctr" defTabSz="457200" rtl="0" eaLnBrk="1" fontAlgn="auto" latinLnBrk="0" hangingPunct="1">
-              <a:lnSpc>
-                <a:spcPct val="100000"/>
-              </a:lnSpc>
-              <a:spcBef>
-                <a:spcPts val="0"/>
-              </a:spcBef>
-              <a:spcAft>
-                <a:spcPts val="0"/>
-              </a:spcAft>
-              <a:buClrTx/>
-              <a:buSzTx/>
-              <a:buFontTx/>
-              <a:buNone/>
-              <a:tabLst/>
-              <a:defRPr/>
-            </a:pPr>
-            <a:endParaRPr kumimoji="0" lang="en-US" sz="1800" b="0" i="0" u="none" strike="noStrike" kern="1200" cap="none" spc="0" normalizeH="0" baseline="0" noProof="0">
-              <a:ln>
-                <a:noFill/>
-              </a:ln>
-              <a:solidFill>
-                <a:prstClr val="white"/>
-              </a:solidFill>
-              <a:effectLst/>
-              <a:uLnTx/>
-              <a:uFillTx/>
-              <a:latin typeface="Calibri" panose="020F0502020204030204"/>
-              <a:ea typeface="+mn-ea"/>
-              <a:cs typeface="+mn-cs"/>
-            </a:endParaRPr>
-          </a:p>
-        </p:txBody>
-      </p:sp>
-      <p:pic>
-        <p:nvPicPr>
-          <p:cNvPr id="7" name="Imagem 6" descr="Uma imagem contendo luz, desenho&#10;&#10;Descrição gerada automaticamente">
-            <a:extLst>
-              <a:ext uri="{FF2B5EF4-FFF2-40B4-BE49-F238E27FC236}">
-                <a16:creationId xmlns:a16="http://schemas.microsoft.com/office/drawing/2014/main" id="{3FD6C9A3-B2D1-4C73-AFA5-325F16E6C0E7}"/>
-              </a:ext>
-            </a:extLst>
-          </p:cNvPr>
-          <p:cNvPicPr>
-            <a:picLocks noChangeAspect="1"/>
-          </p:cNvPicPr>
-          <p:nvPr/>
-        </p:nvPicPr>
-        <p:blipFill>
-          <a:blip r:embed="rId2">
-            <a:extLst>
-              <a:ext uri="{28A0092B-C50C-407E-A947-70E740481C1C}">
-                <a14:useLocalDpi xmlns:a14="http://schemas.microsoft.com/office/drawing/2010/main" val="0"/>
-              </a:ext>
-            </a:extLst>
-          </a:blip>
-          <a:stretch>
-            <a:fillRect/>
-          </a:stretch>
-        </p:blipFill>
-        <p:spPr>
-          <a:xfrm>
-            <a:off x="10229458" y="788862"/>
-            <a:ext cx="926222" cy="1028396"/>
-          </a:xfrm>
-          <a:prstGeom prst="rect">
-            <a:avLst/>
-          </a:prstGeom>
-        </p:spPr>
-      </p:pic>
-      <p:sp>
-        <p:nvSpPr>
-          <p:cNvPr id="5" name="Espaço Reservado para Conteúdo 4">
-            <a:extLst>
-              <a:ext uri="{FF2B5EF4-FFF2-40B4-BE49-F238E27FC236}">
-                <a16:creationId xmlns:a16="http://schemas.microsoft.com/office/drawing/2014/main" id="{8AD7827F-9FCF-4E92-8ECD-9537F41FFAD7}"/>
-              </a:ext>
-            </a:extLst>
-          </p:cNvPr>
-          <p:cNvSpPr>
-            <a:spLocks noGrp="1"/>
-          </p:cNvSpPr>
-          <p:nvPr>
-            <p:ph idx="1"/>
-          </p:nvPr>
-        </p:nvSpPr>
-        <p:spPr/>
-        <p:txBody>
-          <a:bodyPr/>
-          <a:lstStyle/>
-          <a:p>
-            <a:endParaRPr lang="pt-BR"/>
-          </a:p>
-        </p:txBody>
-      </p:sp>
-    </p:spTree>
-    <p:extLst>
-      <p:ext uri="{BB962C8B-B14F-4D97-AF65-F5344CB8AC3E}">
-        <p14:creationId xmlns:p14="http://schemas.microsoft.com/office/powerpoint/2010/main" val="793592461"/>
       </p:ext>
     </p:extLst>
   </p:cSld>
@@ -36149,6 +36248,475 @@
           <a:p>
             <a:r>
               <a:rPr lang="pt-BR" dirty="0"/>
+              <a:t>HELP DESK</a:t>
+            </a:r>
+          </a:p>
+        </p:txBody>
+      </p:sp>
+      <p:sp>
+        <p:nvSpPr>
+          <p:cNvPr id="42" name="Rectangle 41">
+            <a:extLst>
+              <a:ext uri="{FF2B5EF4-FFF2-40B4-BE49-F238E27FC236}">
+                <a16:creationId xmlns:a16="http://schemas.microsoft.com/office/drawing/2014/main" id="{A5711A0E-A428-4ED1-96CB-33D69FD842E4}"/>
+              </a:ext>
+              <a:ext uri="{C183D7F6-B498-43B3-948B-1728B52AA6E4}">
+                <adec:decorative xmlns:adec="http://schemas.microsoft.com/office/drawing/2017/decorative" val="1"/>
+              </a:ext>
+            </a:extLst>
+          </p:cNvPr>
+          <p:cNvSpPr>
+            <a:spLocks noGrp="1" noRot="1" noChangeAspect="1" noMove="1" noResize="1" noEditPoints="1" noAdjustHandles="1" noChangeArrowheads="1" noChangeShapeType="1" noTextEdit="1"/>
+          </p:cNvSpPr>
+          <p:nvPr>
+            <p:extLst>
+              <p:ext uri="{386F3935-93C4-4BCD-93E2-E3B085C9AB24}">
+                <p16:designElem xmlns:p16="http://schemas.microsoft.com/office/powerpoint/2015/main" val="1"/>
+              </p:ext>
+            </p:extLst>
+          </p:nvPr>
+        </p:nvSpPr>
+        <p:spPr>
+          <a:xfrm>
+            <a:off x="1000874" y="2043803"/>
+            <a:ext cx="10190252" cy="80683"/>
+          </a:xfrm>
+          <a:prstGeom prst="rect">
+            <a:avLst/>
+          </a:prstGeom>
+          <a:solidFill>
+            <a:schemeClr val="tx1">
+              <a:lumMod val="50000"/>
+              <a:lumOff val="50000"/>
+              <a:alpha val="65000"/>
+            </a:schemeClr>
+          </a:solidFill>
+          <a:ln>
+            <a:noFill/>
+          </a:ln>
+        </p:spPr>
+        <p:style>
+          <a:lnRef idx="2">
+            <a:schemeClr val="accent1">
+              <a:shade val="50000"/>
+            </a:schemeClr>
+          </a:lnRef>
+          <a:fillRef idx="1">
+            <a:schemeClr val="accent1"/>
+          </a:fillRef>
+          <a:effectRef idx="0">
+            <a:schemeClr val="accent1"/>
+          </a:effectRef>
+          <a:fontRef idx="minor">
+            <a:schemeClr val="lt1"/>
+          </a:fontRef>
+        </p:style>
+        <p:txBody>
+          <a:bodyPr rtlCol="0" anchor="ctr"/>
+          <a:lstStyle/>
+          <a:p>
+            <a:pPr marL="0" marR="0" lvl="0" indent="0" algn="ctr" defTabSz="457200" rtl="0" eaLnBrk="1" fontAlgn="auto" latinLnBrk="0" hangingPunct="1">
+              <a:lnSpc>
+                <a:spcPct val="100000"/>
+              </a:lnSpc>
+              <a:spcBef>
+                <a:spcPts val="0"/>
+              </a:spcBef>
+              <a:spcAft>
+                <a:spcPts val="0"/>
+              </a:spcAft>
+              <a:buClrTx/>
+              <a:buSzTx/>
+              <a:buFontTx/>
+              <a:buNone/>
+              <a:tabLst/>
+              <a:defRPr/>
+            </a:pPr>
+            <a:endParaRPr kumimoji="0" lang="en-US" sz="1800" b="0" i="0" u="none" strike="noStrike" kern="1200" cap="none" spc="0" normalizeH="0" baseline="0" noProof="0">
+              <a:ln>
+                <a:noFill/>
+              </a:ln>
+              <a:solidFill>
+                <a:prstClr val="white"/>
+              </a:solidFill>
+              <a:effectLst/>
+              <a:uLnTx/>
+              <a:uFillTx/>
+              <a:latin typeface="Calibri" panose="020F0502020204030204"/>
+              <a:ea typeface="+mn-ea"/>
+              <a:cs typeface="+mn-cs"/>
+            </a:endParaRPr>
+          </a:p>
+        </p:txBody>
+      </p:sp>
+      <p:pic>
+        <p:nvPicPr>
+          <p:cNvPr id="7" name="Imagem 6" descr="Uma imagem contendo luz, desenho&#10;&#10;Descrição gerada automaticamente">
+            <a:extLst>
+              <a:ext uri="{FF2B5EF4-FFF2-40B4-BE49-F238E27FC236}">
+                <a16:creationId xmlns:a16="http://schemas.microsoft.com/office/drawing/2014/main" id="{3FD6C9A3-B2D1-4C73-AFA5-325F16E6C0E7}"/>
+              </a:ext>
+            </a:extLst>
+          </p:cNvPr>
+          <p:cNvPicPr>
+            <a:picLocks noChangeAspect="1"/>
+          </p:cNvPicPr>
+          <p:nvPr/>
+        </p:nvPicPr>
+        <p:blipFill>
+          <a:blip r:embed="rId2">
+            <a:extLst>
+              <a:ext uri="{28A0092B-C50C-407E-A947-70E740481C1C}">
+                <a14:useLocalDpi xmlns:a14="http://schemas.microsoft.com/office/drawing/2010/main" val="0"/>
+              </a:ext>
+            </a:extLst>
+          </a:blip>
+          <a:stretch>
+            <a:fillRect/>
+          </a:stretch>
+        </p:blipFill>
+        <p:spPr>
+          <a:xfrm>
+            <a:off x="10229458" y="788862"/>
+            <a:ext cx="926222" cy="1028396"/>
+          </a:xfrm>
+          <a:prstGeom prst="rect">
+            <a:avLst/>
+          </a:prstGeom>
+        </p:spPr>
+      </p:pic>
+      <p:pic>
+        <p:nvPicPr>
+          <p:cNvPr id="4" name="Espaço Reservado para Conteúdo 3" descr="Tela de celular com texto preto sobre fundo branco&#10;&#10;Descrição gerada automaticamente">
+            <a:extLst>
+              <a:ext uri="{FF2B5EF4-FFF2-40B4-BE49-F238E27FC236}">
+                <a16:creationId xmlns:a16="http://schemas.microsoft.com/office/drawing/2014/main" id="{FBF84780-404E-45BF-A797-C39BEFD5F987}"/>
+              </a:ext>
+            </a:extLst>
+          </p:cNvPr>
+          <p:cNvPicPr>
+            <a:picLocks noGrp="1" noChangeAspect="1"/>
+          </p:cNvPicPr>
+          <p:nvPr>
+            <p:ph idx="1"/>
+          </p:nvPr>
+        </p:nvPicPr>
+        <p:blipFill rotWithShape="1">
+          <a:blip r:embed="rId3">
+            <a:extLst>
+              <a:ext uri="{28A0092B-C50C-407E-A947-70E740481C1C}">
+                <a14:useLocalDpi xmlns:a14="http://schemas.microsoft.com/office/drawing/2010/main" val="0"/>
+              </a:ext>
+            </a:extLst>
+          </a:blip>
+          <a:srcRect/>
+          <a:stretch/>
+        </p:blipFill>
+        <p:spPr>
+          <a:xfrm>
+            <a:off x="2766680" y="2124486"/>
+            <a:ext cx="6658640" cy="4757982"/>
+          </a:xfrm>
+        </p:spPr>
+      </p:pic>
+    </p:spTree>
+    <p:extLst>
+      <p:ext uri="{BB962C8B-B14F-4D97-AF65-F5344CB8AC3E}">
+        <p14:creationId xmlns:p14="http://schemas.microsoft.com/office/powerpoint/2010/main" val="3515412249"/>
+      </p:ext>
+    </p:extLst>
+  </p:cSld>
+  <p:clrMapOvr>
+    <a:masterClrMapping/>
+  </p:clrMapOvr>
+</p:sld>
+</file>
+
+<file path=ppt/slides/slide21.xml><?xml version="1.0" encoding="utf-8"?>
+<p:sld xmlns:a="http://schemas.openxmlformats.org/drawingml/2006/main" xmlns:r="http://schemas.openxmlformats.org/officeDocument/2006/relationships" xmlns:p="http://schemas.openxmlformats.org/presentationml/2006/main">
+  <p:cSld>
+    <p:bg>
+      <p:bgPr>
+        <a:solidFill>
+          <a:schemeClr val="bg1"/>
+        </a:solidFill>
+        <a:effectLst/>
+      </p:bgPr>
+    </p:bg>
+    <p:spTree>
+      <p:nvGrpSpPr>
+        <p:cNvPr id="1" name=""/>
+        <p:cNvGrpSpPr/>
+        <p:nvPr/>
+      </p:nvGrpSpPr>
+      <p:grpSpPr>
+        <a:xfrm>
+          <a:off x="0" y="0"/>
+          <a:ext cx="0" cy="0"/>
+          <a:chOff x="0" y="0"/>
+          <a:chExt cx="0" cy="0"/>
+        </a:xfrm>
+      </p:grpSpPr>
+      <p:sp>
+        <p:nvSpPr>
+          <p:cNvPr id="2" name="Título 1">
+            <a:extLst>
+              <a:ext uri="{FF2B5EF4-FFF2-40B4-BE49-F238E27FC236}">
+                <a16:creationId xmlns:a16="http://schemas.microsoft.com/office/drawing/2014/main" id="{E0B7F696-990F-4A06-8F6A-14DCE2F6ECEA}"/>
+              </a:ext>
+            </a:extLst>
+          </p:cNvPr>
+          <p:cNvSpPr>
+            <a:spLocks noGrp="1"/>
+          </p:cNvSpPr>
+          <p:nvPr>
+            <p:ph type="title"/>
+          </p:nvPr>
+        </p:nvSpPr>
+        <p:spPr>
+          <a:xfrm>
+            <a:off x="870204" y="606564"/>
+            <a:ext cx="10451592" cy="1325563"/>
+          </a:xfrm>
+        </p:spPr>
+        <p:txBody>
+          <a:bodyPr anchor="ctr">
+            <a:normAutofit/>
+          </a:bodyPr>
+          <a:lstStyle/>
+          <a:p>
+            <a:r>
+              <a:rPr lang="pt-BR" dirty="0"/>
+              <a:t>HELP DESK</a:t>
+            </a:r>
+          </a:p>
+        </p:txBody>
+      </p:sp>
+      <p:sp>
+        <p:nvSpPr>
+          <p:cNvPr id="42" name="Rectangle 41">
+            <a:extLst>
+              <a:ext uri="{FF2B5EF4-FFF2-40B4-BE49-F238E27FC236}">
+                <a16:creationId xmlns:a16="http://schemas.microsoft.com/office/drawing/2014/main" id="{A5711A0E-A428-4ED1-96CB-33D69FD842E4}"/>
+              </a:ext>
+              <a:ext uri="{C183D7F6-B498-43B3-948B-1728B52AA6E4}">
+                <adec:decorative xmlns:adec="http://schemas.microsoft.com/office/drawing/2017/decorative" val="1"/>
+              </a:ext>
+            </a:extLst>
+          </p:cNvPr>
+          <p:cNvSpPr>
+            <a:spLocks noGrp="1" noRot="1" noChangeAspect="1" noMove="1" noResize="1" noEditPoints="1" noAdjustHandles="1" noChangeArrowheads="1" noChangeShapeType="1" noTextEdit="1"/>
+          </p:cNvSpPr>
+          <p:nvPr>
+            <p:extLst>
+              <p:ext uri="{386F3935-93C4-4BCD-93E2-E3B085C9AB24}">
+                <p16:designElem xmlns:p16="http://schemas.microsoft.com/office/powerpoint/2015/main" val="1"/>
+              </p:ext>
+            </p:extLst>
+          </p:nvPr>
+        </p:nvSpPr>
+        <p:spPr>
+          <a:xfrm>
+            <a:off x="1000874" y="2043803"/>
+            <a:ext cx="10190252" cy="80683"/>
+          </a:xfrm>
+          <a:prstGeom prst="rect">
+            <a:avLst/>
+          </a:prstGeom>
+          <a:solidFill>
+            <a:schemeClr val="tx1">
+              <a:lumMod val="50000"/>
+              <a:lumOff val="50000"/>
+              <a:alpha val="65000"/>
+            </a:schemeClr>
+          </a:solidFill>
+          <a:ln>
+            <a:noFill/>
+          </a:ln>
+        </p:spPr>
+        <p:style>
+          <a:lnRef idx="2">
+            <a:schemeClr val="accent1">
+              <a:shade val="50000"/>
+            </a:schemeClr>
+          </a:lnRef>
+          <a:fillRef idx="1">
+            <a:schemeClr val="accent1"/>
+          </a:fillRef>
+          <a:effectRef idx="0">
+            <a:schemeClr val="accent1"/>
+          </a:effectRef>
+          <a:fontRef idx="minor">
+            <a:schemeClr val="lt1"/>
+          </a:fontRef>
+        </p:style>
+        <p:txBody>
+          <a:bodyPr rtlCol="0" anchor="ctr"/>
+          <a:lstStyle/>
+          <a:p>
+            <a:pPr marL="0" marR="0" lvl="0" indent="0" algn="ctr" defTabSz="457200" rtl="0" eaLnBrk="1" fontAlgn="auto" latinLnBrk="0" hangingPunct="1">
+              <a:lnSpc>
+                <a:spcPct val="100000"/>
+              </a:lnSpc>
+              <a:spcBef>
+                <a:spcPts val="0"/>
+              </a:spcBef>
+              <a:spcAft>
+                <a:spcPts val="0"/>
+              </a:spcAft>
+              <a:buClrTx/>
+              <a:buSzTx/>
+              <a:buFontTx/>
+              <a:buNone/>
+              <a:tabLst/>
+              <a:defRPr/>
+            </a:pPr>
+            <a:endParaRPr kumimoji="0" lang="en-US" sz="1800" b="0" i="0" u="none" strike="noStrike" kern="1200" cap="none" spc="0" normalizeH="0" baseline="0" noProof="0">
+              <a:ln>
+                <a:noFill/>
+              </a:ln>
+              <a:solidFill>
+                <a:prstClr val="white"/>
+              </a:solidFill>
+              <a:effectLst/>
+              <a:uLnTx/>
+              <a:uFillTx/>
+              <a:latin typeface="Calibri" panose="020F0502020204030204"/>
+              <a:ea typeface="+mn-ea"/>
+              <a:cs typeface="+mn-cs"/>
+            </a:endParaRPr>
+          </a:p>
+        </p:txBody>
+      </p:sp>
+      <p:pic>
+        <p:nvPicPr>
+          <p:cNvPr id="7" name="Imagem 6" descr="Uma imagem contendo luz, desenho&#10;&#10;Descrição gerada automaticamente">
+            <a:extLst>
+              <a:ext uri="{FF2B5EF4-FFF2-40B4-BE49-F238E27FC236}">
+                <a16:creationId xmlns:a16="http://schemas.microsoft.com/office/drawing/2014/main" id="{3FD6C9A3-B2D1-4C73-AFA5-325F16E6C0E7}"/>
+              </a:ext>
+            </a:extLst>
+          </p:cNvPr>
+          <p:cNvPicPr>
+            <a:picLocks noChangeAspect="1"/>
+          </p:cNvPicPr>
+          <p:nvPr/>
+        </p:nvPicPr>
+        <p:blipFill>
+          <a:blip r:embed="rId2">
+            <a:extLst>
+              <a:ext uri="{28A0092B-C50C-407E-A947-70E740481C1C}">
+                <a14:useLocalDpi xmlns:a14="http://schemas.microsoft.com/office/drawing/2010/main" val="0"/>
+              </a:ext>
+            </a:extLst>
+          </a:blip>
+          <a:stretch>
+            <a:fillRect/>
+          </a:stretch>
+        </p:blipFill>
+        <p:spPr>
+          <a:xfrm>
+            <a:off x="10229458" y="788862"/>
+            <a:ext cx="926222" cy="1028396"/>
+          </a:xfrm>
+          <a:prstGeom prst="rect">
+            <a:avLst/>
+          </a:prstGeom>
+        </p:spPr>
+      </p:pic>
+      <p:sp>
+        <p:nvSpPr>
+          <p:cNvPr id="5" name="Espaço Reservado para Conteúdo 4">
+            <a:extLst>
+              <a:ext uri="{FF2B5EF4-FFF2-40B4-BE49-F238E27FC236}">
+                <a16:creationId xmlns:a16="http://schemas.microsoft.com/office/drawing/2014/main" id="{8AD7827F-9FCF-4E92-8ECD-9537F41FFAD7}"/>
+              </a:ext>
+            </a:extLst>
+          </p:cNvPr>
+          <p:cNvSpPr>
+            <a:spLocks noGrp="1"/>
+          </p:cNvSpPr>
+          <p:nvPr>
+            <p:ph idx="1"/>
+          </p:nvPr>
+        </p:nvSpPr>
+        <p:spPr/>
+        <p:txBody>
+          <a:bodyPr/>
+          <a:lstStyle/>
+          <a:p>
+            <a:endParaRPr lang="pt-BR"/>
+          </a:p>
+        </p:txBody>
+      </p:sp>
+    </p:spTree>
+    <p:extLst>
+      <p:ext uri="{BB962C8B-B14F-4D97-AF65-F5344CB8AC3E}">
+        <p14:creationId xmlns:p14="http://schemas.microsoft.com/office/powerpoint/2010/main" val="793592461"/>
+      </p:ext>
+    </p:extLst>
+  </p:cSld>
+  <p:clrMapOvr>
+    <a:masterClrMapping/>
+  </p:clrMapOvr>
+</p:sld>
+</file>
+
+<file path=ppt/slides/slide22.xml><?xml version="1.0" encoding="utf-8"?>
+<p:sld xmlns:a="http://schemas.openxmlformats.org/drawingml/2006/main" xmlns:r="http://schemas.openxmlformats.org/officeDocument/2006/relationships" xmlns:p="http://schemas.openxmlformats.org/presentationml/2006/main">
+  <p:cSld>
+    <p:bg>
+      <p:bgPr>
+        <a:solidFill>
+          <a:schemeClr val="bg1"/>
+        </a:solidFill>
+        <a:effectLst/>
+      </p:bgPr>
+    </p:bg>
+    <p:spTree>
+      <p:nvGrpSpPr>
+        <p:cNvPr id="1" name=""/>
+        <p:cNvGrpSpPr/>
+        <p:nvPr/>
+      </p:nvGrpSpPr>
+      <p:grpSpPr>
+        <a:xfrm>
+          <a:off x="0" y="0"/>
+          <a:ext cx="0" cy="0"/>
+          <a:chOff x="0" y="0"/>
+          <a:chExt cx="0" cy="0"/>
+        </a:xfrm>
+      </p:grpSpPr>
+      <p:sp>
+        <p:nvSpPr>
+          <p:cNvPr id="2" name="Título 1">
+            <a:extLst>
+              <a:ext uri="{FF2B5EF4-FFF2-40B4-BE49-F238E27FC236}">
+                <a16:creationId xmlns:a16="http://schemas.microsoft.com/office/drawing/2014/main" id="{E0B7F696-990F-4A06-8F6A-14DCE2F6ECEA}"/>
+              </a:ext>
+            </a:extLst>
+          </p:cNvPr>
+          <p:cNvSpPr>
+            <a:spLocks noGrp="1"/>
+          </p:cNvSpPr>
+          <p:nvPr>
+            <p:ph type="title"/>
+          </p:nvPr>
+        </p:nvSpPr>
+        <p:spPr>
+          <a:xfrm>
+            <a:off x="870204" y="606564"/>
+            <a:ext cx="10451592" cy="1325563"/>
+          </a:xfrm>
+        </p:spPr>
+        <p:txBody>
+          <a:bodyPr anchor="ctr">
+            <a:normAutofit/>
+          </a:bodyPr>
+          <a:lstStyle/>
+          <a:p>
+            <a:r>
+              <a:rPr lang="pt-BR" dirty="0"/>
               <a:t>CONCLUSÃO</a:t>
             </a:r>
           </a:p>
@@ -36332,7 +36900,7 @@
 </p:sld>
 </file>
 
-<file path=ppt/slides/slide21.xml><?xml version="1.0" encoding="utf-8"?>
+<file path=ppt/slides/slide23.xml><?xml version="1.0" encoding="utf-8"?>
 <p:sld xmlns:a="http://schemas.openxmlformats.org/drawingml/2006/main" xmlns:r="http://schemas.openxmlformats.org/officeDocument/2006/relationships" xmlns:p="http://schemas.openxmlformats.org/presentationml/2006/main">
   <p:cSld>
     <p:spTree>

</xml_diff>